<commit_message>
Last Update 02-07-2019  9:28:29.64
</commit_message>
<xml_diff>
--- a/Presentations/Unit 1/CS8392-U1-15-Javadocs.pptx
+++ b/Presentations/Unit 1/CS8392-U1-15-Javadocs.pptx
@@ -5,7 +5,7 @@
     <p:sldMasterId id="2147483648" r:id="rId1"/>
   </p:sldMasterIdLst>
   <p:notesMasterIdLst>
-    <p:notesMasterId r:id="rId14"/>
+    <p:notesMasterId r:id="rId13"/>
   </p:notesMasterIdLst>
   <p:sldIdLst>
     <p:sldId id="256" r:id="rId2"/>
@@ -18,8 +18,7 @@
     <p:sldId id="279" r:id="rId9"/>
     <p:sldId id="280" r:id="rId10"/>
     <p:sldId id="281" r:id="rId11"/>
-    <p:sldId id="282" r:id="rId12"/>
-    <p:sldId id="272" r:id="rId13"/>
+    <p:sldId id="272" r:id="rId12"/>
   </p:sldIdLst>
   <p:sldSz cx="9144000" cy="6858000" type="screen4x3"/>
   <p:notesSz cx="6858000" cy="9144000"/>
@@ -204,7 +203,7 @@
             <a:fld id="{9515075B-F3F0-4441-A1BD-B7B515B708FF}" type="datetimeFigureOut">
               <a:rPr lang="en-US" smtClean="0"/>
               <a:pPr/>
-              <a:t>7/23/2018</a:t>
+              <a:t>7/1/2019</a:t>
             </a:fld>
             <a:endParaRPr lang="en-US"/>
           </a:p>
@@ -659,7 +658,7 @@
             <a:fld id="{6E658DF8-B8C0-4C7F-85EB-B53A2DDD44A9}" type="datetimeFigureOut">
               <a:rPr lang="en-US" smtClean="0"/>
               <a:pPr/>
-              <a:t>7/23/2018</a:t>
+              <a:t>7/1/2019</a:t>
             </a:fld>
             <a:endParaRPr lang="en-US"/>
           </a:p>
@@ -826,7 +825,7 @@
             <a:fld id="{6E658DF8-B8C0-4C7F-85EB-B53A2DDD44A9}" type="datetimeFigureOut">
               <a:rPr lang="en-US" smtClean="0"/>
               <a:pPr/>
-              <a:t>7/23/2018</a:t>
+              <a:t>7/1/2019</a:t>
             </a:fld>
             <a:endParaRPr lang="en-US"/>
           </a:p>
@@ -1003,7 +1002,7 @@
             <a:fld id="{6E658DF8-B8C0-4C7F-85EB-B53A2DDD44A9}" type="datetimeFigureOut">
               <a:rPr lang="en-US" smtClean="0"/>
               <a:pPr/>
-              <a:t>7/23/2018</a:t>
+              <a:t>7/1/2019</a:t>
             </a:fld>
             <a:endParaRPr lang="en-US"/>
           </a:p>
@@ -1202,7 +1201,7 @@
             <a:fld id="{6E658DF8-B8C0-4C7F-85EB-B53A2DDD44A9}" type="datetimeFigureOut">
               <a:rPr lang="en-US" smtClean="0"/>
               <a:pPr/>
-              <a:t>7/23/2018</a:t>
+              <a:t>7/1/2019</a:t>
             </a:fld>
             <a:endParaRPr lang="en-US"/>
           </a:p>
@@ -1445,7 +1444,7 @@
             <a:fld id="{6E658DF8-B8C0-4C7F-85EB-B53A2DDD44A9}" type="datetimeFigureOut">
               <a:rPr lang="en-US" smtClean="0"/>
               <a:pPr/>
-              <a:t>7/23/2018</a:t>
+              <a:t>7/1/2019</a:t>
             </a:fld>
             <a:endParaRPr lang="en-US"/>
           </a:p>
@@ -1730,7 +1729,7 @@
             <a:fld id="{6E658DF8-B8C0-4C7F-85EB-B53A2DDD44A9}" type="datetimeFigureOut">
               <a:rPr lang="en-US" smtClean="0"/>
               <a:pPr/>
-              <a:t>7/23/2018</a:t>
+              <a:t>7/1/2019</a:t>
             </a:fld>
             <a:endParaRPr lang="en-US"/>
           </a:p>
@@ -2149,7 +2148,7 @@
             <a:fld id="{6E658DF8-B8C0-4C7F-85EB-B53A2DDD44A9}" type="datetimeFigureOut">
               <a:rPr lang="en-US" smtClean="0"/>
               <a:pPr/>
-              <a:t>7/23/2018</a:t>
+              <a:t>7/1/2019</a:t>
             </a:fld>
             <a:endParaRPr lang="en-US"/>
           </a:p>
@@ -2264,7 +2263,7 @@
             <a:fld id="{6E658DF8-B8C0-4C7F-85EB-B53A2DDD44A9}" type="datetimeFigureOut">
               <a:rPr lang="en-US" smtClean="0"/>
               <a:pPr/>
-              <a:t>7/23/2018</a:t>
+              <a:t>7/1/2019</a:t>
             </a:fld>
             <a:endParaRPr lang="en-US"/>
           </a:p>
@@ -2356,7 +2355,7 @@
             <a:fld id="{6E658DF8-B8C0-4C7F-85EB-B53A2DDD44A9}" type="datetimeFigureOut">
               <a:rPr lang="en-US" smtClean="0"/>
               <a:pPr/>
-              <a:t>7/23/2018</a:t>
+              <a:t>7/1/2019</a:t>
             </a:fld>
             <a:endParaRPr lang="en-US"/>
           </a:p>
@@ -2630,7 +2629,7 @@
             <a:fld id="{6E658DF8-B8C0-4C7F-85EB-B53A2DDD44A9}" type="datetimeFigureOut">
               <a:rPr lang="en-US" smtClean="0"/>
               <a:pPr/>
-              <a:t>7/23/2018</a:t>
+              <a:t>7/1/2019</a:t>
             </a:fld>
             <a:endParaRPr lang="en-US"/>
           </a:p>
@@ -2880,7 +2879,7 @@
             <a:fld id="{6E658DF8-B8C0-4C7F-85EB-B53A2DDD44A9}" type="datetimeFigureOut">
               <a:rPr lang="en-US" smtClean="0"/>
               <a:pPr/>
-              <a:t>7/23/2018</a:t>
+              <a:t>7/1/2019</a:t>
             </a:fld>
             <a:endParaRPr lang="en-US"/>
           </a:p>
@@ -3096,7 +3095,7 @@
             <a:fld id="{6E658DF8-B8C0-4C7F-85EB-B53A2DDD44A9}" type="datetimeFigureOut">
               <a:rPr lang="en-US" smtClean="0"/>
               <a:pPr/>
-              <a:t>7/23/2018</a:t>
+              <a:t>7/1/2019</a:t>
             </a:fld>
             <a:endParaRPr lang="en-US"/>
           </a:p>
@@ -3720,7 +3719,25 @@
           <a:p>
             <a:r>
               <a:rPr lang="en-IN" dirty="0" smtClean="0"/>
-              <a:t>{@value</a:t>
+              <a:t>{@value}</a:t>
+            </a:r>
+          </a:p>
+          <a:p>
+            <a:pPr lvl="1"/>
+            <a:r>
+              <a:rPr lang="en-IN" dirty="0" smtClean="0"/>
+              <a:t>When {@value} is used in the doc comment of a static field, it displays the value of that constant.</a:t>
+            </a:r>
+          </a:p>
+          <a:p>
+            <a:pPr lvl="1"/>
+            <a:r>
+              <a:rPr lang="en-IN" dirty="0" smtClean="0"/>
+              <a:t>{@value </a:t>
+            </a:r>
+            <a:r>
+              <a:rPr lang="en-IN" dirty="0" err="1" smtClean="0"/>
+              <a:t>package.class#field</a:t>
             </a:r>
             <a:r>
               <a:rPr lang="en-IN" dirty="0" smtClean="0"/>
@@ -3728,73 +3745,23 @@
             </a:r>
           </a:p>
           <a:p>
+            <a:r>
+              <a:rPr lang="en-IN" dirty="0" smtClean="0"/>
+              <a:t>@version</a:t>
+            </a:r>
+          </a:p>
+          <a:p>
             <a:pPr lvl="1"/>
             <a:r>
               <a:rPr lang="en-IN" dirty="0" smtClean="0"/>
-              <a:t>When </a:t>
-            </a:r>
+              <a:t>Adds a "Version" subheading with the specified version-text to the generated docs when the -version option is used.</a:t>
+            </a:r>
+          </a:p>
+          <a:p>
+            <a:pPr lvl="1"/>
             <a:r>
               <a:rPr lang="en-IN" dirty="0" smtClean="0"/>
-              <a:t>{@value} is used in the doc comment of a static field, it displays the value of that constant</a:t>
-            </a:r>
-            <a:r>
-              <a:rPr lang="en-IN" dirty="0" smtClean="0"/>
-              <a:t>.</a:t>
-            </a:r>
-          </a:p>
-          <a:p>
-            <a:pPr lvl="1"/>
-            <a:r>
-              <a:rPr lang="en-IN" dirty="0" smtClean="0"/>
-              <a:t>{@</a:t>
-            </a:r>
-            <a:r>
-              <a:rPr lang="en-IN" dirty="0" smtClean="0"/>
-              <a:t>value </a:t>
-            </a:r>
-            <a:r>
-              <a:rPr lang="en-IN" dirty="0" err="1" smtClean="0"/>
-              <a:t>package.class#field</a:t>
-            </a:r>
-            <a:r>
-              <a:rPr lang="en-IN" dirty="0" smtClean="0"/>
-              <a:t>}</a:t>
-            </a:r>
-          </a:p>
-          <a:p>
-            <a:r>
-              <a:rPr lang="en-IN" dirty="0" smtClean="0"/>
-              <a:t>@</a:t>
-            </a:r>
-            <a:r>
-              <a:rPr lang="en-IN" dirty="0" smtClean="0"/>
-              <a:t>version</a:t>
-            </a:r>
-          </a:p>
-          <a:p>
-            <a:pPr lvl="1"/>
-            <a:r>
-              <a:rPr lang="en-IN" dirty="0" smtClean="0"/>
-              <a:t>Adds </a:t>
-            </a:r>
-            <a:r>
-              <a:rPr lang="en-IN" dirty="0" smtClean="0"/>
-              <a:t>a "Version" subheading with the specified version-text to the generated docs when the -version option is used</a:t>
-            </a:r>
-            <a:r>
-              <a:rPr lang="en-IN" dirty="0" smtClean="0"/>
-              <a:t>.</a:t>
-            </a:r>
-          </a:p>
-          <a:p>
-            <a:pPr lvl="1"/>
-            <a:r>
-              <a:rPr lang="en-IN" dirty="0" smtClean="0"/>
-              <a:t>@</a:t>
-            </a:r>
-            <a:r>
-              <a:rPr lang="en-IN" dirty="0" smtClean="0"/>
-              <a:t>version version-text</a:t>
+              <a:t>@version version-text</a:t>
             </a:r>
             <a:endParaRPr lang="en-US" dirty="0"/>
           </a:p>
@@ -3835,69 +3802,6 @@
             <p:ph type="title"/>
           </p:nvPr>
         </p:nvSpPr>
-        <p:spPr/>
-        <p:txBody>
-          <a:bodyPr/>
-          <a:lstStyle/>
-          <a:p>
-            <a:endParaRPr lang="en-US"/>
-          </a:p>
-        </p:txBody>
-      </p:sp>
-      <p:sp>
-        <p:nvSpPr>
-          <p:cNvPr id="3" name="Content Placeholder 2"/>
-          <p:cNvSpPr>
-            <a:spLocks noGrp="1"/>
-          </p:cNvSpPr>
-          <p:nvPr>
-            <p:ph idx="1"/>
-          </p:nvPr>
-        </p:nvSpPr>
-        <p:spPr/>
-        <p:txBody>
-          <a:bodyPr/>
-          <a:lstStyle/>
-          <a:p>
-            <a:endParaRPr lang="en-US"/>
-          </a:p>
-        </p:txBody>
-      </p:sp>
-    </p:spTree>
-  </p:cSld>
-  <p:clrMapOvr>
-    <a:masterClrMapping/>
-  </p:clrMapOvr>
-</p:sld>
-</file>
-
-<file path=ppt/slides/slide12.xml><?xml version="1.0" encoding="utf-8"?>
-<p:sld xmlns:a="http://schemas.openxmlformats.org/drawingml/2006/main" xmlns:r="http://schemas.openxmlformats.org/officeDocument/2006/relationships" xmlns:p="http://schemas.openxmlformats.org/presentationml/2006/main">
-  <p:cSld>
-    <p:spTree>
-      <p:nvGrpSpPr>
-        <p:cNvPr id="1" name=""/>
-        <p:cNvGrpSpPr/>
-        <p:nvPr/>
-      </p:nvGrpSpPr>
-      <p:grpSpPr>
-        <a:xfrm>
-          <a:off x="0" y="0"/>
-          <a:ext cx="0" cy="0"/>
-          <a:chOff x="0" y="0"/>
-          <a:chExt cx="0" cy="0"/>
-        </a:xfrm>
-      </p:grpSpPr>
-      <p:sp>
-        <p:nvSpPr>
-          <p:cNvPr id="2" name="Title 1"/>
-          <p:cNvSpPr>
-            <a:spLocks noGrp="1"/>
-          </p:cNvSpPr>
-          <p:nvPr>
-            <p:ph type="title"/>
-          </p:nvPr>
-        </p:nvSpPr>
         <p:spPr>
           <a:xfrm>
             <a:off x="457200" y="1981200"/>
@@ -4418,11 +4322,7 @@
             </a:r>
             <a:r>
               <a:rPr lang="en-IN" dirty="0" smtClean="0"/>
-              <a:t> and it is used for generating Java code documentation in HTML format from Java source code, which requires documentation in a predefined format</a:t>
-            </a:r>
-            <a:r>
-              <a:rPr lang="en-IN" dirty="0" smtClean="0"/>
-              <a:t>.</a:t>
+              <a:t> and it is used for generating Java code documentation in HTML format from Java source code, which requires documentation in a predefined format.</a:t>
             </a:r>
           </a:p>
         </p:txBody>
@@ -4636,7 +4536,6 @@
               <a:rPr lang="en-US" dirty="0" smtClean="0"/>
               <a:t> is set of comments that helps to generate documents for our project in html pages format.</a:t>
             </a:r>
-            <a:endParaRPr lang="en-US" dirty="0" smtClean="0"/>
           </a:p>
           <a:p>
             <a:r>
@@ -4732,26 +4631,14 @@
           <a:p>
             <a:r>
               <a:rPr lang="en-IN" dirty="0" smtClean="0"/>
-              <a:t>@</a:t>
-            </a:r>
+              <a:t>@author</a:t>
+            </a:r>
+          </a:p>
+          <a:p>
+            <a:pPr lvl="1"/>
             <a:r>
               <a:rPr lang="en-IN" dirty="0" smtClean="0"/>
-              <a:t>author</a:t>
-            </a:r>
-          </a:p>
-          <a:p>
-            <a:pPr lvl="1"/>
-            <a:r>
-              <a:rPr lang="en-IN" dirty="0" smtClean="0"/>
-              <a:t>Adds </a:t>
-            </a:r>
-            <a:r>
-              <a:rPr lang="en-IN" dirty="0" smtClean="0"/>
-              <a:t>the author of a </a:t>
-            </a:r>
-            <a:r>
-              <a:rPr lang="en-IN" dirty="0" smtClean="0"/>
-              <a:t>class</a:t>
+              <a:t>Adds the author of a class</a:t>
             </a:r>
           </a:p>
           <a:p>
@@ -4764,26 +4651,14 @@
           <a:p>
             <a:r>
               <a:rPr lang="en-IN" dirty="0" smtClean="0"/>
-              <a:t>{@</a:t>
-            </a:r>
+              <a:t>{@code}</a:t>
+            </a:r>
+          </a:p>
+          <a:p>
+            <a:pPr lvl="1"/>
             <a:r>
               <a:rPr lang="en-IN" dirty="0" smtClean="0"/>
-              <a:t>code</a:t>
-            </a:r>
-            <a:r>
-              <a:rPr lang="en-IN" dirty="0" smtClean="0"/>
-              <a:t>}</a:t>
-            </a:r>
-          </a:p>
-          <a:p>
-            <a:pPr lvl="1"/>
-            <a:r>
-              <a:rPr lang="en-IN" dirty="0" smtClean="0"/>
-              <a:t>Displays </a:t>
-            </a:r>
-            <a:r>
-              <a:rPr lang="en-IN" dirty="0" smtClean="0"/>
-              <a:t>text in code font without interpreting the text as HTML </a:t>
+              <a:t>Displays text in code font without interpreting the text as HTML </a:t>
             </a:r>
             <a:r>
               <a:rPr lang="en-IN" dirty="0" err="1" smtClean="0"/>
@@ -4799,26 +4674,14 @@
             </a:r>
             <a:r>
               <a:rPr lang="en-IN" dirty="0" smtClean="0"/>
-              <a:t> tags</a:t>
-            </a:r>
+              <a:t> tags.</a:t>
+            </a:r>
+          </a:p>
+          <a:p>
+            <a:pPr lvl="1"/>
             <a:r>
               <a:rPr lang="en-IN" dirty="0" smtClean="0"/>
-              <a:t>.</a:t>
-            </a:r>
-          </a:p>
-          <a:p>
-            <a:pPr lvl="1"/>
-            <a:r>
-              <a:rPr lang="en-IN" dirty="0" smtClean="0"/>
-              <a:t>{@</a:t>
-            </a:r>
-            <a:r>
-              <a:rPr lang="en-IN" dirty="0" smtClean="0"/>
-              <a:t>code text</a:t>
-            </a:r>
-            <a:r>
-              <a:rPr lang="en-IN" dirty="0" smtClean="0"/>
-              <a:t>}</a:t>
+              <a:t>{@code text}</a:t>
             </a:r>
           </a:p>
           <a:p>
@@ -4891,41 +4754,29 @@
           <a:p>
             <a:r>
               <a:rPr lang="en-IN" dirty="0" smtClean="0"/>
-              <a:t>@</a:t>
-            </a:r>
+              <a:t>@deprecated</a:t>
+            </a:r>
+          </a:p>
+          <a:p>
+            <a:pPr lvl="1"/>
             <a:r>
               <a:rPr lang="en-IN" dirty="0" smtClean="0"/>
+              <a:t>Adds a comment indicating that this API should no longer be used.</a:t>
+            </a:r>
+          </a:p>
+          <a:p>
+            <a:pPr lvl="1"/>
+            <a:r>
+              <a:rPr lang="en-IN" dirty="0" smtClean="0"/>
+              <a:t>@deprecated </a:t>
+            </a:r>
+            <a:r>
+              <a:rPr lang="en-IN" dirty="0" err="1" smtClean="0"/>
               <a:t>deprecated</a:t>
             </a:r>
-          </a:p>
-          <a:p>
-            <a:pPr lvl="1"/>
             <a:r>
               <a:rPr lang="en-IN" dirty="0" smtClean="0"/>
-              <a:t>Adds </a:t>
-            </a:r>
-            <a:r>
-              <a:rPr lang="en-IN" dirty="0" smtClean="0"/>
-              <a:t>a comment indicating that this API should no longer be used</a:t>
-            </a:r>
-            <a:r>
-              <a:rPr lang="en-IN" dirty="0" smtClean="0"/>
-              <a:t>.</a:t>
-            </a:r>
-          </a:p>
-          <a:p>
-            <a:pPr lvl="1"/>
-            <a:r>
-              <a:rPr lang="en-IN" dirty="0" smtClean="0"/>
-              <a:t>@</a:t>
-            </a:r>
-            <a:r>
-              <a:rPr lang="en-IN" dirty="0" smtClean="0"/>
-              <a:t>deprecated </a:t>
-            </a:r>
-            <a:r>
-              <a:rPr lang="en-IN" dirty="0" err="1" smtClean="0"/>
-              <a:t>deprecatedtext</a:t>
+              <a:t> text</a:t>
             </a:r>
             <a:endParaRPr lang="en-IN" dirty="0" smtClean="0"/>
           </a:p>
@@ -4939,11 +4790,7 @@
             <a:pPr lvl="1"/>
             <a:r>
               <a:rPr lang="en-IN" dirty="0" smtClean="0"/>
-              <a:t>Adds </a:t>
-            </a:r>
-            <a:r>
-              <a:rPr lang="en-IN" dirty="0" smtClean="0"/>
-              <a:t>a </a:t>
+              <a:t>Adds a </a:t>
             </a:r>
             <a:r>
               <a:rPr lang="en-IN" b="1" dirty="0" smtClean="0"/>
@@ -5042,15 +4889,7 @@
             <a:pPr lvl="1"/>
             <a:r>
               <a:rPr lang="en-IN" dirty="0" smtClean="0"/>
-              <a:t>Adds </a:t>
-            </a:r>
-            <a:r>
-              <a:rPr lang="en-IN" dirty="0" smtClean="0"/>
-              <a:t>a parameter with the specified parameter-name followed by the specified description to the "Parameters" section</a:t>
-            </a:r>
-            <a:r>
-              <a:rPr lang="en-IN" dirty="0" smtClean="0"/>
-              <a:t>.</a:t>
+              <a:t>Adds a parameter with the specified parameter-name followed by the specified description to the "Parameters" section.</a:t>
             </a:r>
           </a:p>
           <a:p>
@@ -5065,11 +4904,7 @@
             </a:r>
             <a:r>
               <a:rPr lang="en-IN" dirty="0" smtClean="0"/>
-              <a:t> </a:t>
-            </a:r>
-            <a:r>
-              <a:rPr lang="en-IN" dirty="0" smtClean="0"/>
-              <a:t>parameter-name description</a:t>
+              <a:t> parameter-name description</a:t>
             </a:r>
           </a:p>
           <a:p>
@@ -5082,26 +4917,14 @@
             <a:pPr lvl="1"/>
             <a:r>
               <a:rPr lang="en-IN" dirty="0" smtClean="0"/>
-              <a:t>Adds </a:t>
-            </a:r>
+              <a:t>Adds a "Returns" section with the description text.</a:t>
+            </a:r>
+          </a:p>
+          <a:p>
+            <a:pPr lvl="1"/>
             <a:r>
               <a:rPr lang="en-IN" dirty="0" smtClean="0"/>
-              <a:t>a "Returns" section with the description text</a:t>
-            </a:r>
-            <a:r>
-              <a:rPr lang="en-IN" dirty="0" smtClean="0"/>
-              <a:t>.</a:t>
-            </a:r>
-          </a:p>
-          <a:p>
-            <a:pPr lvl="1"/>
-            <a:r>
-              <a:rPr lang="en-IN" dirty="0" smtClean="0"/>
-              <a:t>@</a:t>
-            </a:r>
-            <a:r>
-              <a:rPr lang="en-IN" dirty="0" smtClean="0"/>
-              <a:t>return description</a:t>
+              <a:t>@return description</a:t>
             </a:r>
             <a:endParaRPr lang="en-US" dirty="0"/>
           </a:p>
@@ -5174,81 +4997,41 @@
           <a:p>
             <a:r>
               <a:rPr lang="en-IN" dirty="0" smtClean="0"/>
-              <a:t>@</a:t>
-            </a:r>
+              <a:t>@see</a:t>
+            </a:r>
+          </a:p>
+          <a:p>
+            <a:pPr lvl="1"/>
             <a:r>
               <a:rPr lang="en-IN" dirty="0" smtClean="0"/>
-              <a:t>see</a:t>
+              <a:t>Adds a "See Also" heading with a link or text entry that points to reference.</a:t>
             </a:r>
           </a:p>
           <a:p>
             <a:pPr lvl="1"/>
             <a:r>
               <a:rPr lang="en-IN" dirty="0" smtClean="0"/>
-              <a:t>Adds </a:t>
-            </a:r>
+              <a:t>@see reference</a:t>
+            </a:r>
+          </a:p>
+          <a:p>
             <a:r>
               <a:rPr lang="en-IN" dirty="0" smtClean="0"/>
-              <a:t>a "See Also" heading with a link or text entry that points to reference</a:t>
-            </a:r>
+              <a:t>@since</a:t>
+            </a:r>
+          </a:p>
+          <a:p>
+            <a:pPr lvl="1"/>
             <a:r>
               <a:rPr lang="en-IN" dirty="0" smtClean="0"/>
-              <a:t>.</a:t>
+              <a:t>Adds a "Since" heading with the specified since-text to the generated documentation.</a:t>
             </a:r>
           </a:p>
           <a:p>
             <a:pPr lvl="1"/>
             <a:r>
               <a:rPr lang="en-IN" dirty="0" smtClean="0"/>
-              <a:t>@</a:t>
-            </a:r>
-            <a:r>
-              <a:rPr lang="en-IN" dirty="0" smtClean="0"/>
-              <a:t>see </a:t>
-            </a:r>
-            <a:r>
-              <a:rPr lang="en-IN" dirty="0" smtClean="0"/>
-              <a:t>reference</a:t>
-            </a:r>
-          </a:p>
-          <a:p>
-            <a:r>
-              <a:rPr lang="en-IN" dirty="0" smtClean="0"/>
-              <a:t>@</a:t>
-            </a:r>
-            <a:r>
-              <a:rPr lang="en-IN" dirty="0" smtClean="0"/>
-              <a:t>since</a:t>
-            </a:r>
-          </a:p>
-          <a:p>
-            <a:pPr lvl="1"/>
-            <a:r>
-              <a:rPr lang="en-IN" dirty="0" smtClean="0"/>
-              <a:t>Adds </a:t>
-            </a:r>
-            <a:r>
-              <a:rPr lang="en-IN" dirty="0" smtClean="0"/>
-              <a:t>a "Since" heading with the specified since-text to the generated documentation</a:t>
-            </a:r>
-            <a:r>
-              <a:rPr lang="en-IN" dirty="0" smtClean="0"/>
-              <a:t>.</a:t>
-            </a:r>
-          </a:p>
-          <a:p>
-            <a:pPr lvl="1"/>
-            <a:r>
-              <a:rPr lang="en-IN" dirty="0" smtClean="0"/>
-              <a:t>@</a:t>
-            </a:r>
-            <a:r>
-              <a:rPr lang="en-IN" dirty="0" smtClean="0"/>
-              <a:t>since </a:t>
-            </a:r>
-            <a:r>
-              <a:rPr lang="en-IN" dirty="0" smtClean="0"/>
-              <a:t>release</a:t>
+              <a:t>@since release</a:t>
             </a:r>
           </a:p>
           <a:p>
@@ -5261,30 +5044,14 @@
             <a:pPr lvl="1"/>
             <a:r>
               <a:rPr lang="en-IN" dirty="0" smtClean="0"/>
-              <a:t>The </a:t>
-            </a:r>
+              <a:t>The @throws and @exception tags are synonyms.</a:t>
+            </a:r>
+          </a:p>
+          <a:p>
+            <a:pPr lvl="1"/>
             <a:r>
               <a:rPr lang="en-IN" dirty="0" smtClean="0"/>
-              <a:t>@throws and @exception tags are synonyms</a:t>
-            </a:r>
-            <a:r>
-              <a:rPr lang="en-IN" dirty="0" smtClean="0"/>
-              <a:t>.</a:t>
-            </a:r>
-          </a:p>
-          <a:p>
-            <a:pPr lvl="1"/>
-            <a:r>
-              <a:rPr lang="en-IN" dirty="0" smtClean="0"/>
-              <a:t>@</a:t>
-            </a:r>
-            <a:r>
-              <a:rPr lang="en-IN" dirty="0" smtClean="0"/>
-              <a:t>throws class-name </a:t>
-            </a:r>
-            <a:r>
-              <a:rPr lang="en-IN" dirty="0" smtClean="0"/>
-              <a:t>description</a:t>
+              <a:t>@throws class-name description</a:t>
             </a:r>
             <a:endParaRPr lang="en-US" dirty="0"/>
           </a:p>

</xml_diff>